<commit_message>
Lade till svensk f?rklaring p? sph och in presentationen i ett tema. Om alla tycker det ?r snyggt tycker jag vi k?r p? den stylade.
</commit_message>
<xml_diff>
--- a/powerpoint/fluidsimulation-presentation.pptx
+++ b/powerpoint/fluidsimulation-presentation.pptx
@@ -294,7 +294,7 @@
             <a:fld id="{347BD319-C441-4740-BDB2-35E25C52CCE7}" type="datetimeFigureOut">
               <a:rPr lang="sv-SE" smtClean="0"/>
               <a:pPr/>
-              <a:t>2011-03-17</a:t>
+              <a:t>2011-03-20</a:t>
             </a:fld>
             <a:endParaRPr lang="sv-SE"/>
           </a:p>
@@ -461,7 +461,7 @@
             <a:fld id="{347BD319-C441-4740-BDB2-35E25C52CCE7}" type="datetimeFigureOut">
               <a:rPr lang="sv-SE" smtClean="0"/>
               <a:pPr/>
-              <a:t>2011-03-17</a:t>
+              <a:t>2011-03-20</a:t>
             </a:fld>
             <a:endParaRPr lang="sv-SE"/>
           </a:p>
@@ -638,7 +638,7 @@
             <a:fld id="{347BD319-C441-4740-BDB2-35E25C52CCE7}" type="datetimeFigureOut">
               <a:rPr lang="sv-SE" smtClean="0"/>
               <a:pPr/>
-              <a:t>2011-03-17</a:t>
+              <a:t>2011-03-20</a:t>
             </a:fld>
             <a:endParaRPr lang="sv-SE"/>
           </a:p>
@@ -805,7 +805,7 @@
             <a:fld id="{347BD319-C441-4740-BDB2-35E25C52CCE7}" type="datetimeFigureOut">
               <a:rPr lang="sv-SE" smtClean="0"/>
               <a:pPr/>
-              <a:t>2011-03-17</a:t>
+              <a:t>2011-03-20</a:t>
             </a:fld>
             <a:endParaRPr lang="sv-SE"/>
           </a:p>
@@ -1048,7 +1048,7 @@
             <a:fld id="{347BD319-C441-4740-BDB2-35E25C52CCE7}" type="datetimeFigureOut">
               <a:rPr lang="sv-SE" smtClean="0"/>
               <a:pPr/>
-              <a:t>2011-03-17</a:t>
+              <a:t>2011-03-20</a:t>
             </a:fld>
             <a:endParaRPr lang="sv-SE"/>
           </a:p>
@@ -1333,7 +1333,7 @@
             <a:fld id="{347BD319-C441-4740-BDB2-35E25C52CCE7}" type="datetimeFigureOut">
               <a:rPr lang="sv-SE" smtClean="0"/>
               <a:pPr/>
-              <a:t>2011-03-17</a:t>
+              <a:t>2011-03-20</a:t>
             </a:fld>
             <a:endParaRPr lang="sv-SE"/>
           </a:p>
@@ -1752,7 +1752,7 @@
             <a:fld id="{347BD319-C441-4740-BDB2-35E25C52CCE7}" type="datetimeFigureOut">
               <a:rPr lang="sv-SE" smtClean="0"/>
               <a:pPr/>
-              <a:t>2011-03-17</a:t>
+              <a:t>2011-03-20</a:t>
             </a:fld>
             <a:endParaRPr lang="sv-SE"/>
           </a:p>
@@ -1867,7 +1867,7 @@
             <a:fld id="{347BD319-C441-4740-BDB2-35E25C52CCE7}" type="datetimeFigureOut">
               <a:rPr lang="sv-SE" smtClean="0"/>
               <a:pPr/>
-              <a:t>2011-03-17</a:t>
+              <a:t>2011-03-20</a:t>
             </a:fld>
             <a:endParaRPr lang="sv-SE"/>
           </a:p>
@@ -1959,7 +1959,7 @@
             <a:fld id="{347BD319-C441-4740-BDB2-35E25C52CCE7}" type="datetimeFigureOut">
               <a:rPr lang="sv-SE" smtClean="0"/>
               <a:pPr/>
-              <a:t>2011-03-17</a:t>
+              <a:t>2011-03-20</a:t>
             </a:fld>
             <a:endParaRPr lang="sv-SE"/>
           </a:p>
@@ -2233,7 +2233,7 @@
             <a:fld id="{347BD319-C441-4740-BDB2-35E25C52CCE7}" type="datetimeFigureOut">
               <a:rPr lang="sv-SE" smtClean="0"/>
               <a:pPr/>
-              <a:t>2011-03-17</a:t>
+              <a:t>2011-03-20</a:t>
             </a:fld>
             <a:endParaRPr lang="sv-SE"/>
           </a:p>
@@ -2483,7 +2483,7 @@
             <a:fld id="{347BD319-C441-4740-BDB2-35E25C52CCE7}" type="datetimeFigureOut">
               <a:rPr lang="sv-SE" smtClean="0"/>
               <a:pPr/>
-              <a:t>2011-03-17</a:t>
+              <a:t>2011-03-20</a:t>
             </a:fld>
             <a:endParaRPr lang="sv-SE"/>
           </a:p>
@@ -2693,7 +2693,7 @@
             <a:fld id="{347BD319-C441-4740-BDB2-35E25C52CCE7}" type="datetimeFigureOut">
               <a:rPr lang="sv-SE" smtClean="0"/>
               <a:pPr/>
-              <a:t>2011-03-17</a:t>
+              <a:t>2011-03-20</a:t>
             </a:fld>
             <a:endParaRPr lang="sv-SE"/>
           </a:p>
@@ -3239,22 +3239,14 @@
             </a:r>
             <a:r>
               <a:rPr lang="en-US" sz="2400" dirty="0" smtClean="0"/>
-              <a:t> Fluid </a:t>
-            </a:r>
+              <a:t> Fluid Simulation (2005)</a:t>
+            </a:r>
+            <a:endParaRPr lang="sv-SE" sz="2400" dirty="0" smtClean="0"/>
+          </a:p>
+          <a:p>
             <a:r>
               <a:rPr lang="en-US" sz="2400" dirty="0" smtClean="0"/>
-              <a:t>Simulation (2005)</a:t>
-            </a:r>
-            <a:endParaRPr lang="sv-SE" sz="2400" dirty="0" smtClean="0"/>
-          </a:p>
-          <a:p>
-            <a:r>
-              <a:rPr lang="en-US" sz="2400" dirty="0" smtClean="0"/>
-              <a:t>Particle-Based Fluid Simulation for Interactive </a:t>
-            </a:r>
-            <a:r>
-              <a:rPr lang="en-US" sz="2400" dirty="0" smtClean="0"/>
-              <a:t>Applications (2003)</a:t>
+              <a:t>Particle-Based Fluid Simulation for Interactive Applications (2003)</a:t>
             </a:r>
             <a:endParaRPr lang="sv-SE" sz="2400" dirty="0" smtClean="0"/>
           </a:p>
@@ -3321,7 +3313,7 @@
           <p:nvPr/>
         </p:nvPicPr>
         <p:blipFill>
-          <a:blip r:embed="rId4"/>
+          <a:blip r:embed="rId4" cstate="print"/>
           <a:srcRect/>
           <a:stretch>
             <a:fillRect/>
@@ -3404,9 +3396,16 @@
             <p:ph idx="1"/>
           </p:nvPr>
         </p:nvSpPr>
-        <p:spPr/>
-        <p:txBody>
-          <a:bodyPr/>
+        <p:spPr>
+          <a:xfrm>
+            <a:off x="457200" y="1600201"/>
+            <a:ext cx="8229600" cy="2620888"/>
+          </a:xfrm>
+        </p:spPr>
+        <p:txBody>
+          <a:bodyPr>
+            <a:normAutofit lnSpcReduction="10000"/>
+          </a:bodyPr>
           <a:lstStyle/>
           <a:p>
             <a:r>
@@ -3414,8 +3413,20 @@
               <a:t>Navier</a:t>
             </a:r>
             <a:r>
+              <a:rPr lang="sv-SE" dirty="0" err="1" smtClean="0"/>
+              <a:t>-</a:t>
+            </a:r>
+            <a:r>
+              <a:rPr lang="sv-SE" dirty="0" err="1" smtClean="0"/>
+              <a:t>Stokes</a:t>
+            </a:r>
+            <a:r>
               <a:rPr lang="sv-SE" dirty="0" smtClean="0"/>
-              <a:t> Stokes ekvationer beskriver beteendet hos fluider</a:t>
+              <a:t> </a:t>
+            </a:r>
+            <a:r>
+              <a:rPr lang="sv-SE" dirty="0" smtClean="0"/>
+              <a:t>ekvationer beskriver beteendet hos fluider</a:t>
             </a:r>
           </a:p>
           <a:p>
@@ -3424,45 +3435,18 @@
           <a:p>
             <a:r>
               <a:rPr lang="sv-SE" dirty="0" smtClean="0"/>
-              <a:t>SPH är en räknemetod som används för att simulera fluider</a:t>
-            </a:r>
-            <a:endParaRPr lang="en-US" dirty="0"/>
-          </a:p>
-        </p:txBody>
-      </p:sp>
-      <p:pic>
-        <p:nvPicPr>
-          <p:cNvPr id="2053" name="Picture 5"/>
-          <p:cNvPicPr>
-            <a:picLocks noChangeAspect="1" noChangeArrowheads="1"/>
-          </p:cNvPicPr>
-          <p:nvPr/>
-        </p:nvPicPr>
-        <p:blipFill>
-          <a:blip r:embed="rId2"/>
-          <a:srcRect/>
-          <a:stretch>
-            <a:fillRect/>
-          </a:stretch>
-        </p:blipFill>
-        <p:spPr bwMode="auto">
-          <a:xfrm>
-            <a:off x="1285852" y="4500570"/>
-            <a:ext cx="6114289" cy="1357322"/>
-          </a:xfrm>
-          <a:prstGeom prst="rect">
-            <a:avLst/>
-          </a:prstGeom>
-          <a:noFill/>
-          <a:ln w="9525">
-            <a:noFill/>
-            <a:miter lim="800000"/>
-            <a:headEnd/>
-            <a:tailEnd/>
-          </a:ln>
-          <a:effectLst/>
-        </p:spPr>
-      </p:pic>
+              <a:t>SPH är en räknemetod som används för att simulera </a:t>
+            </a:r>
+            <a:r>
+              <a:rPr lang="sv-SE" dirty="0" smtClean="0"/>
+              <a:t>fluider</a:t>
+            </a:r>
+          </a:p>
+          <a:p>
+            <a:endParaRPr lang="sv-SE" dirty="0" smtClean="0"/>
+          </a:p>
+        </p:txBody>
+      </p:sp>
       <p:pic>
         <p:nvPicPr>
           <p:cNvPr id="2054" name="Picture 6"/>
@@ -3472,7 +3456,7 @@
           <p:nvPr/>
         </p:nvPicPr>
         <p:blipFill>
-          <a:blip r:embed="rId3"/>
+          <a:blip r:embed="rId2" cstate="print"/>
           <a:srcRect/>
           <a:stretch>
             <a:fillRect/>
@@ -3496,6 +3480,122 @@
           <a:effectLst/>
         </p:spPr>
       </p:pic>
+      <p:pic>
+        <p:nvPicPr>
+          <p:cNvPr id="1027" name="Picture 3" descr="D:\Skola- Linköpings universitet, Campus Norrköping\År III\TNM085\Projekt\powerpoint\sph-ekvation.png"/>
+          <p:cNvPicPr>
+            <a:picLocks noChangeAspect="1" noChangeArrowheads="1"/>
+          </p:cNvPicPr>
+          <p:nvPr/>
+        </p:nvPicPr>
+        <p:blipFill>
+          <a:blip r:embed="rId3" cstate="print"/>
+          <a:srcRect/>
+          <a:stretch>
+            <a:fillRect/>
+          </a:stretch>
+        </p:blipFill>
+        <p:spPr bwMode="auto">
+          <a:xfrm>
+            <a:off x="2051720" y="4221088"/>
+            <a:ext cx="2880320" cy="734424"/>
+          </a:xfrm>
+          <a:prstGeom prst="rect">
+            <a:avLst/>
+          </a:prstGeom>
+          <a:noFill/>
+        </p:spPr>
+      </p:pic>
+      <p:sp>
+        <p:nvSpPr>
+          <p:cNvPr id="9" name="textruta 8"/>
+          <p:cNvSpPr txBox="1"/>
+          <p:nvPr/>
+        </p:nvSpPr>
+        <p:spPr>
+          <a:xfrm>
+            <a:off x="827584" y="5086925"/>
+            <a:ext cx="7632848" cy="646331"/>
+          </a:xfrm>
+          <a:prstGeom prst="rect">
+            <a:avLst/>
+          </a:prstGeom>
+          <a:noFill/>
+        </p:spPr>
+        <p:txBody>
+          <a:bodyPr wrap="square" rtlCol="0">
+            <a:spAutoFit/>
+          </a:bodyPr>
+          <a:lstStyle/>
+          <a:p>
+            <a:r>
+              <a:rPr lang="sv-SE" dirty="0" smtClean="0"/>
+              <a:t>Där </a:t>
+            </a:r>
+            <a:r>
+              <a:rPr lang="sv-SE" i="1" dirty="0" smtClean="0"/>
+              <a:t>m</a:t>
+            </a:r>
+            <a:r>
+              <a:rPr lang="sv-SE" i="1" baseline="-25000" dirty="0" smtClean="0"/>
+              <a:t>j</a:t>
+            </a:r>
+            <a:r>
+              <a:rPr lang="sv-SE" dirty="0" smtClean="0"/>
+              <a:t> är massan och </a:t>
+            </a:r>
+            <a:r>
+              <a:rPr lang="sv-SE" i="1" dirty="0" err="1" smtClean="0"/>
+              <a:t>ρ</a:t>
+            </a:r>
+            <a:r>
+              <a:rPr lang="sv-SE" i="1" baseline="-25000" dirty="0" err="1" smtClean="0"/>
+              <a:t>j</a:t>
+            </a:r>
+            <a:r>
+              <a:rPr lang="sv-SE" dirty="0" smtClean="0"/>
+              <a:t> </a:t>
+            </a:r>
+            <a:r>
+              <a:rPr lang="sv-SE" dirty="0" smtClean="0"/>
+              <a:t>är densiteten hos partikeln </a:t>
+            </a:r>
+            <a:r>
+              <a:rPr lang="sv-SE" i="1" dirty="0" smtClean="0"/>
+              <a:t>j</a:t>
+            </a:r>
+            <a:r>
+              <a:rPr lang="sv-SE" dirty="0" smtClean="0"/>
+              <a:t>. Funktionen </a:t>
+            </a:r>
+            <a:r>
+              <a:rPr lang="sv-SE" i="1" dirty="0" smtClean="0"/>
+              <a:t>W</a:t>
+            </a:r>
+            <a:r>
+              <a:rPr lang="sv-SE" dirty="0" smtClean="0"/>
+              <a:t> är en viktningsfunktion kallad "</a:t>
+            </a:r>
+            <a:r>
+              <a:rPr lang="sv-SE" dirty="0" err="1" smtClean="0"/>
+              <a:t>smooth</a:t>
+            </a:r>
+            <a:r>
+              <a:rPr lang="sv-SE" dirty="0" smtClean="0"/>
+              <a:t> </a:t>
+            </a:r>
+            <a:r>
+              <a:rPr lang="sv-SE" dirty="0" err="1" smtClean="0"/>
+              <a:t>kernel</a:t>
+            </a:r>
+            <a:r>
+              <a:rPr lang="sv-SE" dirty="0" smtClean="0"/>
+              <a:t>".</a:t>
+            </a:r>
+            <a:endParaRPr lang="sv-SE" dirty="0"/>
+          </a:p>
+        </p:txBody>
+      </p:sp>
     </p:spTree>
   </p:cSld>
   <p:clrMapOvr>
@@ -3572,7 +3672,7 @@
           <p:nvPr/>
         </p:nvPicPr>
         <p:blipFill>
-          <a:blip r:embed="rId2"/>
+          <a:blip r:embed="rId2" cstate="print"/>
           <a:srcRect/>
           <a:stretch>
             <a:fillRect/>
@@ -3677,27 +3777,7 @@
             </a:r>
             <a:r>
               <a:rPr lang="sv-SE" dirty="0" smtClean="0"/>
-              <a:t>) </a:t>
-            </a:r>
-            <a:r>
-              <a:rPr lang="sv-SE" dirty="0" smtClean="0"/>
-              <a:t>är </a:t>
-            </a:r>
-            <a:r>
-              <a:rPr lang="sv-SE" dirty="0" smtClean="0"/>
-              <a:t>en uppsättning verktyg från </a:t>
-            </a:r>
-            <a:r>
-              <a:rPr lang="sv-SE" dirty="0" smtClean="0"/>
-              <a:t>Microsoft </a:t>
-            </a:r>
-            <a:r>
-              <a:rPr lang="sv-SE" dirty="0" smtClean="0"/>
-              <a:t>som är till för att underlätta </a:t>
-            </a:r>
-            <a:r>
-              <a:rPr lang="sv-SE" dirty="0" smtClean="0"/>
-              <a:t>utvecklingen av spel till Windows, </a:t>
+              <a:t>) är en uppsättning verktyg från Microsoft som är till för att underlätta utvecklingen av spel till Windows, </a:t>
             </a:r>
             <a:r>
               <a:rPr lang="sv-SE" dirty="0" err="1" smtClean="0"/>
@@ -3713,11 +3793,7 @@
             </a:r>
             <a:r>
               <a:rPr lang="sv-SE" dirty="0" smtClean="0"/>
-              <a:t> och Windows Mobile</a:t>
-            </a:r>
-            <a:r>
-              <a:rPr lang="sv-SE" dirty="0" smtClean="0"/>
-              <a:t>.</a:t>
+              <a:t> och Windows Mobile.</a:t>
             </a:r>
           </a:p>
           <a:p>

</xml_diff>